<commit_message>
feat: added generate strategy logic
</commit_message>
<xml_diff>
--- a/src/ppt-generator/pptx-templates/Strategy.pptx
+++ b/src/ppt-generator/pptx-templates/Strategy.pptx
@@ -5591,23 +5591,7 @@
                   <a:schemeClr val="dk1"/>
                 </a:solidFill>
               </a:rPr>
-              <a:t>{{</a:t>
-            </a:r>
-            <a:r>
-              <a:rPr lang="en" sz="900">
-                <a:solidFill>
-                  <a:schemeClr val="dk1"/>
-                </a:solidFill>
-              </a:rPr>
-              <a:t>icon</a:t>
-            </a:r>
-            <a:r>
-              <a:rPr lang="en" sz="900">
-                <a:solidFill>
-                  <a:schemeClr val="dk1"/>
-                </a:solidFill>
-              </a:rPr>
-              <a:t>1}}</a:t>
+              <a:t>{{icon1}}</a:t>
             </a:r>
             <a:endParaRPr sz="900">
               <a:solidFill>
@@ -6025,7 +6009,7 @@
                   <a:schemeClr val="dk2"/>
                 </a:solidFill>
               </a:rPr>
-              <a:t>{{overviewt}}</a:t>
+              <a:t>{{overview}}</a:t>
             </a:r>
             <a:endParaRPr sz="800">
               <a:solidFill>
@@ -6575,23 +6559,7 @@
                   <a:schemeClr val="dk1"/>
                 </a:solidFill>
               </a:rPr>
-              <a:t>{{</a:t>
-            </a:r>
-            <a:r>
-              <a:rPr lang="en" sz="900">
-                <a:solidFill>
-                  <a:schemeClr val="dk1"/>
-                </a:solidFill>
-              </a:rPr>
-              <a:t>icon</a:t>
-            </a:r>
-            <a:r>
-              <a:rPr lang="en" sz="900">
-                <a:solidFill>
-                  <a:schemeClr val="dk1"/>
-                </a:solidFill>
-              </a:rPr>
-              <a:t>2}}</a:t>
+              <a:t>{{icon2}}</a:t>
             </a:r>
             <a:endParaRPr sz="900">
               <a:solidFill>
@@ -6641,23 +6609,7 @@
                   <a:schemeClr val="dk1"/>
                 </a:solidFill>
               </a:rPr>
-              <a:t>{{</a:t>
-            </a:r>
-            <a:r>
-              <a:rPr lang="en" sz="900">
-                <a:solidFill>
-                  <a:schemeClr val="dk1"/>
-                </a:solidFill>
-              </a:rPr>
-              <a:t>icon</a:t>
-            </a:r>
-            <a:r>
-              <a:rPr lang="en" sz="900">
-                <a:solidFill>
-                  <a:schemeClr val="dk1"/>
-                </a:solidFill>
-              </a:rPr>
-              <a:t>3}}</a:t>
+              <a:t>{{icon3}}</a:t>
             </a:r>
             <a:endParaRPr sz="900">
               <a:solidFill>
@@ -6707,23 +6659,7 @@
                   <a:schemeClr val="dk1"/>
                 </a:solidFill>
               </a:rPr>
-              <a:t>{{</a:t>
-            </a:r>
-            <a:r>
-              <a:rPr lang="en" sz="900">
-                <a:solidFill>
-                  <a:schemeClr val="dk1"/>
-                </a:solidFill>
-              </a:rPr>
-              <a:t>icon</a:t>
-            </a:r>
-            <a:r>
-              <a:rPr lang="en" sz="900">
-                <a:solidFill>
-                  <a:schemeClr val="dk1"/>
-                </a:solidFill>
-              </a:rPr>
-              <a:t>5}}</a:t>
+              <a:t>{{icon5}}</a:t>
             </a:r>
             <a:endParaRPr sz="900">
               <a:solidFill>
@@ -6773,23 +6709,7 @@
                   <a:schemeClr val="dk1"/>
                 </a:solidFill>
               </a:rPr>
-              <a:t>{{</a:t>
-            </a:r>
-            <a:r>
-              <a:rPr lang="en" sz="900">
-                <a:solidFill>
-                  <a:schemeClr val="dk1"/>
-                </a:solidFill>
-              </a:rPr>
-              <a:t>icon</a:t>
-            </a:r>
-            <a:r>
-              <a:rPr lang="en" sz="900">
-                <a:solidFill>
-                  <a:schemeClr val="dk1"/>
-                </a:solidFill>
-              </a:rPr>
-              <a:t>4}}</a:t>
+              <a:t>{{icon4}}</a:t>
             </a:r>
             <a:endParaRPr sz="900">
               <a:solidFill>
@@ -7639,15 +7559,7 @@
                   <a:schemeClr val="dk2"/>
                 </a:solidFill>
               </a:rPr>
-              <a:t>{{c</a:t>
-            </a:r>
-            <a:r>
-              <a:rPr lang="en" sz="800">
-                <a:solidFill>
-                  <a:schemeClr val="dk2"/>
-                </a:solidFill>
-              </a:rPr>
-              <a:t>ash}}</a:t>
+              <a:t>{{cash}}</a:t>
             </a:r>
             <a:endParaRPr sz="800">
               <a:solidFill>
@@ -7797,15 +7709,7 @@
                   <a:schemeClr val="dk2"/>
                 </a:solidFill>
               </a:rPr>
-              <a:t>{{c</a:t>
-            </a:r>
-            <a:r>
-              <a:rPr lang="en" sz="800">
-                <a:solidFill>
-                  <a:schemeClr val="dk2"/>
-                </a:solidFill>
-              </a:rPr>
-              <a:t>omparativeIndex}}</a:t>
+              <a:t>{{comparativeIndex}}</a:t>
             </a:r>
             <a:endParaRPr sz="800">
               <a:solidFill>
@@ -7855,15 +7759,7 @@
                   <a:schemeClr val="dk2"/>
                 </a:solidFill>
               </a:rPr>
-              <a:t>{{s</a:t>
-            </a:r>
-            <a:r>
-              <a:rPr lang="en" sz="800">
-                <a:solidFill>
-                  <a:schemeClr val="dk2"/>
-                </a:solidFill>
-              </a:rPr>
-              <a:t>ector}}</a:t>
+              <a:t>{{sector}}</a:t>
             </a:r>
             <a:endParaRPr sz="800">
               <a:solidFill>
@@ -7913,15 +7809,7 @@
                   <a:schemeClr val="dk2"/>
                 </a:solidFill>
               </a:rPr>
-              <a:t>{{f</a:t>
-            </a:r>
-            <a:r>
-              <a:rPr lang="en" sz="800">
-                <a:solidFill>
-                  <a:schemeClr val="dk2"/>
-                </a:solidFill>
-              </a:rPr>
-              <a:t>undStructure}}</a:t>
+              <a:t>{{fundStructure}}</a:t>
             </a:r>
             <a:endParaRPr sz="800">
               <a:solidFill>
@@ -8021,15 +7909,7 @@
                   <a:schemeClr val="dk2"/>
                 </a:solidFill>
               </a:rPr>
-              <a:t>{{ocf</a:t>
-            </a:r>
-            <a:r>
-              <a:rPr lang="en" sz="800">
-                <a:solidFill>
-                  <a:schemeClr val="dk2"/>
-                </a:solidFill>
-              </a:rPr>
-              <a:t>}}</a:t>
+              <a:t>{{ocf}}</a:t>
             </a:r>
             <a:endParaRPr sz="800">
               <a:solidFill>
@@ -8197,7 +8077,7 @@
         </p:nvSpPr>
         <p:spPr>
           <a:xfrm>
-            <a:off x="1592500" y="2041875"/>
+            <a:off x="1643275" y="2041875"/>
             <a:ext cx="1472400" cy="880200"/>
           </a:xfrm>
           <a:prstGeom prst="rect">

</xml_diff>